<commit_message>
uprava pravopisu a prezetnacie
</commit_message>
<xml_diff>
--- a/prezentacia/Softvér pre diabetikov.pptx
+++ b/prezentacia/Softvér pre diabetikov.pptx
@@ -119,6 +119,907 @@
     </p:ext>
   </p:extLst>
 </p:presentation>
+</file>
+
+<file path=ppt/charts/chart1.xml><?xml version="1.0" encoding="utf-8"?>
+<c:chartSpace xmlns:c="http://schemas.openxmlformats.org/drawingml/2006/chart" xmlns:a="http://schemas.openxmlformats.org/drawingml/2006/main" xmlns:r="http://schemas.openxmlformats.org/officeDocument/2006/relationships" xmlns:c16r2="http://schemas.microsoft.com/office/drawing/2015/06/chart">
+  <c:date1904 val="0"/>
+  <c:lang val="en-US"/>
+  <c:roundedCorners val="0"/>
+  <mc:AlternateContent xmlns:mc="http://schemas.openxmlformats.org/markup-compatibility/2006">
+    <mc:Choice xmlns:c14="http://schemas.microsoft.com/office/drawing/2007/8/2/chart" Requires="c14">
+      <c14:style val="102"/>
+    </mc:Choice>
+    <mc:Fallback>
+      <c:style val="2"/>
+    </mc:Fallback>
+  </mc:AlternateContent>
+  <c:chart>
+    <c:title>
+      <c:tx>
+        <c:rich>
+          <a:bodyPr rot="0" spcFirstLastPara="1" vertOverflow="ellipsis" vert="horz" wrap="square" anchor="ctr" anchorCtr="1"/>
+          <a:lstStyle/>
+          <a:p>
+            <a:pPr>
+              <a:defRPr sz="2400" b="0" i="0" u="none" strike="noStrike" kern="1200" spc="0" baseline="0">
+                <a:solidFill>
+                  <a:schemeClr val="tx1">
+                    <a:lumMod val="65000"/>
+                    <a:lumOff val="35000"/>
+                  </a:schemeClr>
+                </a:solidFill>
+                <a:latin typeface="+mn-lt"/>
+                <a:ea typeface="+mn-ea"/>
+                <a:cs typeface="+mn-cs"/>
+              </a:defRPr>
+            </a:pPr>
+            <a:r>
+              <a:rPr lang="sk-SK" sz="2400"/>
+              <a:t>Top 10 krajín:</a:t>
+            </a:r>
+            <a:r>
+              <a:rPr lang="sk-SK" sz="2400" baseline="0"/>
+              <a:t> p</a:t>
+            </a:r>
+            <a:r>
+              <a:rPr lang="en-US" sz="2400"/>
+              <a:t>očet</a:t>
+            </a:r>
+            <a:r>
+              <a:rPr lang="sk-SK" sz="2400"/>
+              <a:t> Diabetikov v Miliónoch </a:t>
+            </a:r>
+            <a:endParaRPr lang="en-US" sz="2400"/>
+          </a:p>
+        </c:rich>
+      </c:tx>
+      <c:overlay val="0"/>
+      <c:spPr>
+        <a:noFill/>
+        <a:ln>
+          <a:noFill/>
+        </a:ln>
+        <a:effectLst/>
+      </c:spPr>
+      <c:txPr>
+        <a:bodyPr rot="0" spcFirstLastPara="1" vertOverflow="ellipsis" vert="horz" wrap="square" anchor="ctr" anchorCtr="1"/>
+        <a:lstStyle/>
+        <a:p>
+          <a:pPr>
+            <a:defRPr sz="2400" b="0" i="0" u="none" strike="noStrike" kern="1200" spc="0" baseline="0">
+              <a:solidFill>
+                <a:schemeClr val="tx1">
+                  <a:lumMod val="65000"/>
+                  <a:lumOff val="35000"/>
+                </a:schemeClr>
+              </a:solidFill>
+              <a:latin typeface="+mn-lt"/>
+              <a:ea typeface="+mn-ea"/>
+              <a:cs typeface="+mn-cs"/>
+            </a:defRPr>
+          </a:pPr>
+          <a:endParaRPr lang="en-US"/>
+        </a:p>
+      </c:txPr>
+    </c:title>
+    <c:autoTitleDeleted val="0"/>
+    <c:plotArea>
+      <c:layout/>
+      <c:barChart>
+        <c:barDir val="col"/>
+        <c:grouping val="clustered"/>
+        <c:varyColors val="0"/>
+        <c:ser>
+          <c:idx val="0"/>
+          <c:order val="0"/>
+          <c:tx>
+            <c:strRef>
+              <c:f>Sheet1!$C$2</c:f>
+              <c:strCache>
+                <c:ptCount val="1"/>
+                <c:pt idx="0">
+                  <c:v>Počet</c:v>
+                </c:pt>
+              </c:strCache>
+            </c:strRef>
+          </c:tx>
+          <c:spPr>
+            <a:solidFill>
+              <a:schemeClr val="accent1"/>
+            </a:solidFill>
+            <a:ln>
+              <a:noFill/>
+            </a:ln>
+            <a:effectLst/>
+          </c:spPr>
+          <c:invertIfNegative val="0"/>
+          <c:cat>
+            <c:strRef>
+              <c:f>Sheet1!$B$3:$B$12</c:f>
+              <c:strCache>
+                <c:ptCount val="10"/>
+                <c:pt idx="0">
+                  <c:v>China</c:v>
+                </c:pt>
+                <c:pt idx="1">
+                  <c:v>India</c:v>
+                </c:pt>
+                <c:pt idx="2">
+                  <c:v>United States</c:v>
+                </c:pt>
+                <c:pt idx="3">
+                  <c:v>Pakistan</c:v>
+                </c:pt>
+                <c:pt idx="4">
+                  <c:v>Brazil</c:v>
+                </c:pt>
+                <c:pt idx="5">
+                  <c:v>Mexico</c:v>
+                </c:pt>
+                <c:pt idx="6">
+                  <c:v>Indonesia</c:v>
+                </c:pt>
+                <c:pt idx="7">
+                  <c:v>Germany</c:v>
+                </c:pt>
+                <c:pt idx="8">
+                  <c:v>Egypt</c:v>
+                </c:pt>
+                <c:pt idx="9">
+                  <c:v>Bangladesh</c:v>
+                </c:pt>
+              </c:strCache>
+            </c:strRef>
+          </c:cat>
+          <c:val>
+            <c:numRef>
+              <c:f>Sheet1!$C$3:$C$12</c:f>
+              <c:numCache>
+                <c:formatCode>#,##0</c:formatCode>
+                <c:ptCount val="10"/>
+                <c:pt idx="0" formatCode="#,##0.##">
+                  <c:v>116.4</c:v>
+                </c:pt>
+                <c:pt idx="1">
+                  <c:v>77</c:v>
+                </c:pt>
+                <c:pt idx="2">
+                  <c:v>31</c:v>
+                </c:pt>
+                <c:pt idx="3" formatCode="#,##0.##">
+                  <c:v>19.399999999999999</c:v>
+                </c:pt>
+                <c:pt idx="4" formatCode="#,##0.##">
+                  <c:v>16.8</c:v>
+                </c:pt>
+                <c:pt idx="5" formatCode="#,##0.##">
+                  <c:v>12.8</c:v>
+                </c:pt>
+                <c:pt idx="6" formatCode="#,##0.##">
+                  <c:v>10.7</c:v>
+                </c:pt>
+                <c:pt idx="7" formatCode="#,##0.##">
+                  <c:v>9.5</c:v>
+                </c:pt>
+                <c:pt idx="8" formatCode="#,##0.##">
+                  <c:v>8.9</c:v>
+                </c:pt>
+                <c:pt idx="9" formatCode="#,##0.##">
+                  <c:v>8.4</c:v>
+                </c:pt>
+              </c:numCache>
+            </c:numRef>
+          </c:val>
+          <c:extLst>
+            <c:ext xmlns:c16="http://schemas.microsoft.com/office/drawing/2014/chart" uri="{C3380CC4-5D6E-409C-BE32-E72D297353CC}">
+              <c16:uniqueId val="{00000000-4176-445A-851F-6A68D7A10649}"/>
+            </c:ext>
+          </c:extLst>
+        </c:ser>
+        <c:dLbls>
+          <c:showLegendKey val="0"/>
+          <c:showVal val="0"/>
+          <c:showCatName val="0"/>
+          <c:showSerName val="0"/>
+          <c:showPercent val="0"/>
+          <c:showBubbleSize val="0"/>
+        </c:dLbls>
+        <c:gapWidth val="219"/>
+        <c:overlap val="-27"/>
+        <c:axId val="664655520"/>
+        <c:axId val="664662736"/>
+      </c:barChart>
+      <c:catAx>
+        <c:axId val="664655520"/>
+        <c:scaling>
+          <c:orientation val="minMax"/>
+        </c:scaling>
+        <c:delete val="0"/>
+        <c:axPos val="b"/>
+        <c:numFmt formatCode="General" sourceLinked="1"/>
+        <c:majorTickMark val="none"/>
+        <c:minorTickMark val="none"/>
+        <c:tickLblPos val="nextTo"/>
+        <c:spPr>
+          <a:noFill/>
+          <a:ln w="9525" cap="flat" cmpd="sng" algn="ctr">
+            <a:solidFill>
+              <a:schemeClr val="tx1">
+                <a:lumMod val="15000"/>
+                <a:lumOff val="85000"/>
+              </a:schemeClr>
+            </a:solidFill>
+            <a:round/>
+          </a:ln>
+          <a:effectLst/>
+        </c:spPr>
+        <c:txPr>
+          <a:bodyPr rot="-60000000" spcFirstLastPara="1" vertOverflow="ellipsis" vert="horz" wrap="square" anchor="ctr" anchorCtr="1"/>
+          <a:lstStyle/>
+          <a:p>
+            <a:pPr>
+              <a:defRPr sz="1400" b="0" i="0" u="none" strike="noStrike" kern="1200" baseline="0">
+                <a:solidFill>
+                  <a:schemeClr val="tx1">
+                    <a:lumMod val="65000"/>
+                    <a:lumOff val="35000"/>
+                  </a:schemeClr>
+                </a:solidFill>
+                <a:latin typeface="+mn-lt"/>
+                <a:ea typeface="+mn-ea"/>
+                <a:cs typeface="+mn-cs"/>
+              </a:defRPr>
+            </a:pPr>
+            <a:endParaRPr lang="en-US"/>
+          </a:p>
+        </c:txPr>
+        <c:crossAx val="664662736"/>
+        <c:crosses val="autoZero"/>
+        <c:auto val="1"/>
+        <c:lblAlgn val="ctr"/>
+        <c:lblOffset val="100"/>
+        <c:noMultiLvlLbl val="0"/>
+      </c:catAx>
+      <c:valAx>
+        <c:axId val="664662736"/>
+        <c:scaling>
+          <c:orientation val="minMax"/>
+        </c:scaling>
+        <c:delete val="0"/>
+        <c:axPos val="l"/>
+        <c:majorGridlines>
+          <c:spPr>
+            <a:ln w="9525" cap="flat" cmpd="sng" algn="ctr">
+              <a:solidFill>
+                <a:schemeClr val="tx1">
+                  <a:lumMod val="15000"/>
+                  <a:lumOff val="85000"/>
+                </a:schemeClr>
+              </a:solidFill>
+              <a:round/>
+            </a:ln>
+            <a:effectLst/>
+          </c:spPr>
+        </c:majorGridlines>
+        <c:numFmt formatCode="#,##0.##" sourceLinked="1"/>
+        <c:majorTickMark val="none"/>
+        <c:minorTickMark val="none"/>
+        <c:tickLblPos val="nextTo"/>
+        <c:spPr>
+          <a:noFill/>
+          <a:ln>
+            <a:noFill/>
+          </a:ln>
+          <a:effectLst/>
+        </c:spPr>
+        <c:txPr>
+          <a:bodyPr rot="-60000000" spcFirstLastPara="1" vertOverflow="ellipsis" vert="horz" wrap="square" anchor="ctr" anchorCtr="1"/>
+          <a:lstStyle/>
+          <a:p>
+            <a:pPr>
+              <a:defRPr sz="900" b="0" i="0" u="none" strike="noStrike" kern="1200" baseline="0">
+                <a:solidFill>
+                  <a:schemeClr val="tx1">
+                    <a:lumMod val="65000"/>
+                    <a:lumOff val="35000"/>
+                  </a:schemeClr>
+                </a:solidFill>
+                <a:latin typeface="+mn-lt"/>
+                <a:ea typeface="+mn-ea"/>
+                <a:cs typeface="+mn-cs"/>
+              </a:defRPr>
+            </a:pPr>
+            <a:endParaRPr lang="en-US"/>
+          </a:p>
+        </c:txPr>
+        <c:crossAx val="664655520"/>
+        <c:crosses val="autoZero"/>
+        <c:crossBetween val="between"/>
+      </c:valAx>
+      <c:spPr>
+        <a:noFill/>
+        <a:ln>
+          <a:noFill/>
+        </a:ln>
+        <a:effectLst/>
+      </c:spPr>
+    </c:plotArea>
+    <c:plotVisOnly val="1"/>
+    <c:dispBlanksAs val="gap"/>
+    <c:extLst>
+      <c:ext xmlns:c16r3="http://schemas.microsoft.com/office/drawing/2017/03/chart" uri="{56B9EC1D-385E-4148-901F-78D8002777C0}">
+        <c16r3:dataDisplayOptions16>
+          <c16r3:dispNaAsBlank val="1"/>
+        </c16r3:dataDisplayOptions16>
+      </c:ext>
+    </c:extLst>
+    <c:showDLblsOverMax val="0"/>
+  </c:chart>
+  <c:spPr>
+    <a:noFill/>
+    <a:ln>
+      <a:noFill/>
+    </a:ln>
+    <a:effectLst/>
+  </c:spPr>
+  <c:txPr>
+    <a:bodyPr/>
+    <a:lstStyle/>
+    <a:p>
+      <a:pPr>
+        <a:defRPr/>
+      </a:pPr>
+      <a:endParaRPr lang="en-US"/>
+    </a:p>
+  </c:txPr>
+  <c:externalData r:id="rId3">
+    <c:autoUpdate val="0"/>
+  </c:externalData>
+</c:chartSpace>
+</file>
+
+<file path=ppt/charts/colors1.xml><?xml version="1.0" encoding="utf-8"?>
+<cs:colorStyle xmlns:cs="http://schemas.microsoft.com/office/drawing/2012/chartStyle" xmlns:a="http://schemas.openxmlformats.org/drawingml/2006/main" meth="cycle" id="10">
+  <a:schemeClr val="accent1"/>
+  <a:schemeClr val="accent2"/>
+  <a:schemeClr val="accent3"/>
+  <a:schemeClr val="accent4"/>
+  <a:schemeClr val="accent5"/>
+  <a:schemeClr val="accent6"/>
+  <cs:variation/>
+  <cs:variation>
+    <a:lumMod val="60000"/>
+  </cs:variation>
+  <cs:variation>
+    <a:lumMod val="80000"/>
+    <a:lumOff val="20000"/>
+  </cs:variation>
+  <cs:variation>
+    <a:lumMod val="80000"/>
+  </cs:variation>
+  <cs:variation>
+    <a:lumMod val="60000"/>
+    <a:lumOff val="40000"/>
+  </cs:variation>
+  <cs:variation>
+    <a:lumMod val="50000"/>
+  </cs:variation>
+  <cs:variation>
+    <a:lumMod val="70000"/>
+    <a:lumOff val="30000"/>
+  </cs:variation>
+  <cs:variation>
+    <a:lumMod val="70000"/>
+  </cs:variation>
+  <cs:variation>
+    <a:lumMod val="50000"/>
+    <a:lumOff val="50000"/>
+  </cs:variation>
+</cs:colorStyle>
+</file>
+
+<file path=ppt/charts/style1.xml><?xml version="1.0" encoding="utf-8"?>
+<cs:chartStyle xmlns:cs="http://schemas.microsoft.com/office/drawing/2012/chartStyle" xmlns:a="http://schemas.openxmlformats.org/drawingml/2006/main" id="201">
+  <cs:axisTitle>
+    <cs:lnRef idx="0"/>
+    <cs:fillRef idx="0"/>
+    <cs:effectRef idx="0"/>
+    <cs:fontRef idx="minor">
+      <a:schemeClr val="tx1">
+        <a:lumMod val="65000"/>
+        <a:lumOff val="35000"/>
+      </a:schemeClr>
+    </cs:fontRef>
+    <cs:defRPr sz="1000" kern="1200"/>
+  </cs:axisTitle>
+  <cs:categoryAxis>
+    <cs:lnRef idx="0"/>
+    <cs:fillRef idx="0"/>
+    <cs:effectRef idx="0"/>
+    <cs:fontRef idx="minor">
+      <a:schemeClr val="tx1">
+        <a:lumMod val="65000"/>
+        <a:lumOff val="35000"/>
+      </a:schemeClr>
+    </cs:fontRef>
+    <cs:spPr>
+      <a:ln w="9525" cap="flat" cmpd="sng" algn="ctr">
+        <a:solidFill>
+          <a:schemeClr val="tx1">
+            <a:lumMod val="15000"/>
+            <a:lumOff val="85000"/>
+          </a:schemeClr>
+        </a:solidFill>
+        <a:round/>
+      </a:ln>
+    </cs:spPr>
+    <cs:defRPr sz="900" kern="1200"/>
+  </cs:categoryAxis>
+  <cs:chartArea mods="allowNoFillOverride allowNoLineOverride">
+    <cs:lnRef idx="0"/>
+    <cs:fillRef idx="0"/>
+    <cs:effectRef idx="0"/>
+    <cs:fontRef idx="minor">
+      <a:schemeClr val="tx1"/>
+    </cs:fontRef>
+    <cs:spPr>
+      <a:solidFill>
+        <a:schemeClr val="bg1"/>
+      </a:solidFill>
+      <a:ln w="9525" cap="flat" cmpd="sng" algn="ctr">
+        <a:solidFill>
+          <a:schemeClr val="tx1">
+            <a:lumMod val="15000"/>
+            <a:lumOff val="85000"/>
+          </a:schemeClr>
+        </a:solidFill>
+        <a:round/>
+      </a:ln>
+    </cs:spPr>
+    <cs:defRPr sz="1000" kern="1200"/>
+  </cs:chartArea>
+  <cs:dataLabel>
+    <cs:lnRef idx="0"/>
+    <cs:fillRef idx="0"/>
+    <cs:effectRef idx="0"/>
+    <cs:fontRef idx="minor">
+      <a:schemeClr val="tx1">
+        <a:lumMod val="75000"/>
+        <a:lumOff val="25000"/>
+      </a:schemeClr>
+    </cs:fontRef>
+    <cs:defRPr sz="900" kern="1200"/>
+  </cs:dataLabel>
+  <cs:dataLabelCallout>
+    <cs:lnRef idx="0"/>
+    <cs:fillRef idx="0"/>
+    <cs:effectRef idx="0"/>
+    <cs:fontRef idx="minor">
+      <a:schemeClr val="dk1">
+        <a:lumMod val="65000"/>
+        <a:lumOff val="35000"/>
+      </a:schemeClr>
+    </cs:fontRef>
+    <cs:spPr>
+      <a:solidFill>
+        <a:schemeClr val="lt1"/>
+      </a:solidFill>
+      <a:ln>
+        <a:solidFill>
+          <a:schemeClr val="dk1">
+            <a:lumMod val="25000"/>
+            <a:lumOff val="75000"/>
+          </a:schemeClr>
+        </a:solidFill>
+      </a:ln>
+    </cs:spPr>
+    <cs:defRPr sz="900" kern="1200"/>
+    <cs:bodyPr rot="0" spcFirstLastPara="1" vertOverflow="clip" horzOverflow="clip" vert="horz" wrap="square" lIns="36576" tIns="18288" rIns="36576" bIns="18288" anchor="ctr" anchorCtr="1">
+      <a:spAutoFit/>
+    </cs:bodyPr>
+  </cs:dataLabelCallout>
+  <cs:dataPoint>
+    <cs:lnRef idx="0"/>
+    <cs:fillRef idx="1">
+      <cs:styleClr val="auto"/>
+    </cs:fillRef>
+    <cs:effectRef idx="0"/>
+    <cs:fontRef idx="minor">
+      <a:schemeClr val="tx1"/>
+    </cs:fontRef>
+  </cs:dataPoint>
+  <cs:dataPoint3D>
+    <cs:lnRef idx="0"/>
+    <cs:fillRef idx="1">
+      <cs:styleClr val="auto"/>
+    </cs:fillRef>
+    <cs:effectRef idx="0"/>
+    <cs:fontRef idx="minor">
+      <a:schemeClr val="tx1"/>
+    </cs:fontRef>
+  </cs:dataPoint3D>
+  <cs:dataPointLine>
+    <cs:lnRef idx="0">
+      <cs:styleClr val="auto"/>
+    </cs:lnRef>
+    <cs:fillRef idx="1"/>
+    <cs:effectRef idx="0"/>
+    <cs:fontRef idx="minor">
+      <a:schemeClr val="tx1"/>
+    </cs:fontRef>
+    <cs:spPr>
+      <a:ln w="28575" cap="rnd">
+        <a:solidFill>
+          <a:schemeClr val="phClr"/>
+        </a:solidFill>
+        <a:round/>
+      </a:ln>
+    </cs:spPr>
+  </cs:dataPointLine>
+  <cs:dataPointMarker>
+    <cs:lnRef idx="0">
+      <cs:styleClr val="auto"/>
+    </cs:lnRef>
+    <cs:fillRef idx="1">
+      <cs:styleClr val="auto"/>
+    </cs:fillRef>
+    <cs:effectRef idx="0"/>
+    <cs:fontRef idx="minor">
+      <a:schemeClr val="tx1"/>
+    </cs:fontRef>
+    <cs:spPr>
+      <a:ln w="9525">
+        <a:solidFill>
+          <a:schemeClr val="phClr"/>
+        </a:solidFill>
+      </a:ln>
+    </cs:spPr>
+  </cs:dataPointMarker>
+  <cs:dataPointMarkerLayout symbol="circle" size="5"/>
+  <cs:dataPointWireframe>
+    <cs:lnRef idx="0">
+      <cs:styleClr val="auto"/>
+    </cs:lnRef>
+    <cs:fillRef idx="1"/>
+    <cs:effectRef idx="0"/>
+    <cs:fontRef idx="minor">
+      <a:schemeClr val="tx1"/>
+    </cs:fontRef>
+    <cs:spPr>
+      <a:ln w="9525" cap="rnd">
+        <a:solidFill>
+          <a:schemeClr val="phClr"/>
+        </a:solidFill>
+        <a:round/>
+      </a:ln>
+    </cs:spPr>
+  </cs:dataPointWireframe>
+  <cs:dataTable>
+    <cs:lnRef idx="0"/>
+    <cs:fillRef idx="0"/>
+    <cs:effectRef idx="0"/>
+    <cs:fontRef idx="minor">
+      <a:schemeClr val="tx1">
+        <a:lumMod val="65000"/>
+        <a:lumOff val="35000"/>
+      </a:schemeClr>
+    </cs:fontRef>
+    <cs:spPr>
+      <a:noFill/>
+      <a:ln w="9525" cap="flat" cmpd="sng" algn="ctr">
+        <a:solidFill>
+          <a:schemeClr val="tx1">
+            <a:lumMod val="15000"/>
+            <a:lumOff val="85000"/>
+          </a:schemeClr>
+        </a:solidFill>
+        <a:round/>
+      </a:ln>
+    </cs:spPr>
+    <cs:defRPr sz="900" kern="1200"/>
+  </cs:dataTable>
+  <cs:downBar>
+    <cs:lnRef idx="0"/>
+    <cs:fillRef idx="0"/>
+    <cs:effectRef idx="0"/>
+    <cs:fontRef idx="minor">
+      <a:schemeClr val="dk1"/>
+    </cs:fontRef>
+    <cs:spPr>
+      <a:solidFill>
+        <a:schemeClr val="dk1">
+          <a:lumMod val="65000"/>
+          <a:lumOff val="35000"/>
+        </a:schemeClr>
+      </a:solidFill>
+      <a:ln w="9525">
+        <a:solidFill>
+          <a:schemeClr val="tx1">
+            <a:lumMod val="65000"/>
+            <a:lumOff val="35000"/>
+          </a:schemeClr>
+        </a:solidFill>
+      </a:ln>
+    </cs:spPr>
+  </cs:downBar>
+  <cs:dropLine>
+    <cs:lnRef idx="0"/>
+    <cs:fillRef idx="0"/>
+    <cs:effectRef idx="0"/>
+    <cs:fontRef idx="minor">
+      <a:schemeClr val="tx1"/>
+    </cs:fontRef>
+    <cs:spPr>
+      <a:ln w="9525" cap="flat" cmpd="sng" algn="ctr">
+        <a:solidFill>
+          <a:schemeClr val="tx1">
+            <a:lumMod val="35000"/>
+            <a:lumOff val="65000"/>
+          </a:schemeClr>
+        </a:solidFill>
+        <a:round/>
+      </a:ln>
+    </cs:spPr>
+  </cs:dropLine>
+  <cs:errorBar>
+    <cs:lnRef idx="0"/>
+    <cs:fillRef idx="0"/>
+    <cs:effectRef idx="0"/>
+    <cs:fontRef idx="minor">
+      <a:schemeClr val="tx1"/>
+    </cs:fontRef>
+    <cs:spPr>
+      <a:ln w="9525" cap="flat" cmpd="sng" algn="ctr">
+        <a:solidFill>
+          <a:schemeClr val="tx1">
+            <a:lumMod val="65000"/>
+            <a:lumOff val="35000"/>
+          </a:schemeClr>
+        </a:solidFill>
+        <a:round/>
+      </a:ln>
+    </cs:spPr>
+  </cs:errorBar>
+  <cs:floor>
+    <cs:lnRef idx="0"/>
+    <cs:fillRef idx="0"/>
+    <cs:effectRef idx="0"/>
+    <cs:fontRef idx="minor">
+      <a:schemeClr val="tx1"/>
+    </cs:fontRef>
+    <cs:spPr>
+      <a:noFill/>
+      <a:ln>
+        <a:noFill/>
+      </a:ln>
+    </cs:spPr>
+  </cs:floor>
+  <cs:gridlineMajor>
+    <cs:lnRef idx="0"/>
+    <cs:fillRef idx="0"/>
+    <cs:effectRef idx="0"/>
+    <cs:fontRef idx="minor">
+      <a:schemeClr val="tx1"/>
+    </cs:fontRef>
+    <cs:spPr>
+      <a:ln w="9525" cap="flat" cmpd="sng" algn="ctr">
+        <a:solidFill>
+          <a:schemeClr val="tx1">
+            <a:lumMod val="15000"/>
+            <a:lumOff val="85000"/>
+          </a:schemeClr>
+        </a:solidFill>
+        <a:round/>
+      </a:ln>
+    </cs:spPr>
+  </cs:gridlineMajor>
+  <cs:gridlineMinor>
+    <cs:lnRef idx="0"/>
+    <cs:fillRef idx="0"/>
+    <cs:effectRef idx="0"/>
+    <cs:fontRef idx="minor">
+      <a:schemeClr val="tx1"/>
+    </cs:fontRef>
+    <cs:spPr>
+      <a:ln w="9525" cap="flat" cmpd="sng" algn="ctr">
+        <a:solidFill>
+          <a:schemeClr val="tx1">
+            <a:lumMod val="5000"/>
+            <a:lumOff val="95000"/>
+          </a:schemeClr>
+        </a:solidFill>
+        <a:round/>
+      </a:ln>
+    </cs:spPr>
+  </cs:gridlineMinor>
+  <cs:hiLoLine>
+    <cs:lnRef idx="0"/>
+    <cs:fillRef idx="0"/>
+    <cs:effectRef idx="0"/>
+    <cs:fontRef idx="minor">
+      <a:schemeClr val="tx1"/>
+    </cs:fontRef>
+    <cs:spPr>
+      <a:ln w="9525" cap="flat" cmpd="sng" algn="ctr">
+        <a:solidFill>
+          <a:schemeClr val="tx1">
+            <a:lumMod val="75000"/>
+            <a:lumOff val="25000"/>
+          </a:schemeClr>
+        </a:solidFill>
+        <a:round/>
+      </a:ln>
+    </cs:spPr>
+  </cs:hiLoLine>
+  <cs:leaderLine>
+    <cs:lnRef idx="0"/>
+    <cs:fillRef idx="0"/>
+    <cs:effectRef idx="0"/>
+    <cs:fontRef idx="minor">
+      <a:schemeClr val="tx1"/>
+    </cs:fontRef>
+    <cs:spPr>
+      <a:ln w="9525" cap="flat" cmpd="sng" algn="ctr">
+        <a:solidFill>
+          <a:schemeClr val="tx1">
+            <a:lumMod val="35000"/>
+            <a:lumOff val="65000"/>
+          </a:schemeClr>
+        </a:solidFill>
+        <a:round/>
+      </a:ln>
+    </cs:spPr>
+  </cs:leaderLine>
+  <cs:legend>
+    <cs:lnRef idx="0"/>
+    <cs:fillRef idx="0"/>
+    <cs:effectRef idx="0"/>
+    <cs:fontRef idx="minor">
+      <a:schemeClr val="tx1">
+        <a:lumMod val="65000"/>
+        <a:lumOff val="35000"/>
+      </a:schemeClr>
+    </cs:fontRef>
+    <cs:defRPr sz="900" kern="1200"/>
+  </cs:legend>
+  <cs:plotArea mods="allowNoFillOverride allowNoLineOverride">
+    <cs:lnRef idx="0"/>
+    <cs:fillRef idx="0"/>
+    <cs:effectRef idx="0"/>
+    <cs:fontRef idx="minor">
+      <a:schemeClr val="tx1"/>
+    </cs:fontRef>
+  </cs:plotArea>
+  <cs:plotArea3D mods="allowNoFillOverride allowNoLineOverride">
+    <cs:lnRef idx="0"/>
+    <cs:fillRef idx="0"/>
+    <cs:effectRef idx="0"/>
+    <cs:fontRef idx="minor">
+      <a:schemeClr val="tx1"/>
+    </cs:fontRef>
+  </cs:plotArea3D>
+  <cs:seriesAxis>
+    <cs:lnRef idx="0"/>
+    <cs:fillRef idx="0"/>
+    <cs:effectRef idx="0"/>
+    <cs:fontRef idx="minor">
+      <a:schemeClr val="tx1">
+        <a:lumMod val="65000"/>
+        <a:lumOff val="35000"/>
+      </a:schemeClr>
+    </cs:fontRef>
+    <cs:defRPr sz="900" kern="1200"/>
+  </cs:seriesAxis>
+  <cs:seriesLine>
+    <cs:lnRef idx="0"/>
+    <cs:fillRef idx="0"/>
+    <cs:effectRef idx="0"/>
+    <cs:fontRef idx="minor">
+      <a:schemeClr val="tx1"/>
+    </cs:fontRef>
+    <cs:spPr>
+      <a:ln w="9525" cap="flat" cmpd="sng" algn="ctr">
+        <a:solidFill>
+          <a:schemeClr val="tx1">
+            <a:lumMod val="35000"/>
+            <a:lumOff val="65000"/>
+          </a:schemeClr>
+        </a:solidFill>
+        <a:round/>
+      </a:ln>
+    </cs:spPr>
+  </cs:seriesLine>
+  <cs:title>
+    <cs:lnRef idx="0"/>
+    <cs:fillRef idx="0"/>
+    <cs:effectRef idx="0"/>
+    <cs:fontRef idx="minor">
+      <a:schemeClr val="tx1">
+        <a:lumMod val="65000"/>
+        <a:lumOff val="35000"/>
+      </a:schemeClr>
+    </cs:fontRef>
+    <cs:defRPr sz="1400" b="0" kern="1200" spc="0" baseline="0"/>
+  </cs:title>
+  <cs:trendline>
+    <cs:lnRef idx="0">
+      <cs:styleClr val="auto"/>
+    </cs:lnRef>
+    <cs:fillRef idx="0"/>
+    <cs:effectRef idx="0"/>
+    <cs:fontRef idx="minor">
+      <a:schemeClr val="tx1"/>
+    </cs:fontRef>
+    <cs:spPr>
+      <a:ln w="19050" cap="rnd">
+        <a:solidFill>
+          <a:schemeClr val="phClr"/>
+        </a:solidFill>
+        <a:prstDash val="sysDot"/>
+      </a:ln>
+    </cs:spPr>
+  </cs:trendline>
+  <cs:trendlineLabel>
+    <cs:lnRef idx="0"/>
+    <cs:fillRef idx="0"/>
+    <cs:effectRef idx="0"/>
+    <cs:fontRef idx="minor">
+      <a:schemeClr val="tx1">
+        <a:lumMod val="65000"/>
+        <a:lumOff val="35000"/>
+      </a:schemeClr>
+    </cs:fontRef>
+    <cs:defRPr sz="900" kern="1200"/>
+  </cs:trendlineLabel>
+  <cs:upBar>
+    <cs:lnRef idx="0"/>
+    <cs:fillRef idx="0"/>
+    <cs:effectRef idx="0"/>
+    <cs:fontRef idx="minor">
+      <a:schemeClr val="dk1"/>
+    </cs:fontRef>
+    <cs:spPr>
+      <a:solidFill>
+        <a:schemeClr val="lt1"/>
+      </a:solidFill>
+      <a:ln w="9525">
+        <a:solidFill>
+          <a:schemeClr val="tx1">
+            <a:lumMod val="15000"/>
+            <a:lumOff val="85000"/>
+          </a:schemeClr>
+        </a:solidFill>
+      </a:ln>
+    </cs:spPr>
+  </cs:upBar>
+  <cs:valueAxis>
+    <cs:lnRef idx="0"/>
+    <cs:fillRef idx="0"/>
+    <cs:effectRef idx="0"/>
+    <cs:fontRef idx="minor">
+      <a:schemeClr val="tx1">
+        <a:lumMod val="65000"/>
+        <a:lumOff val="35000"/>
+      </a:schemeClr>
+    </cs:fontRef>
+    <cs:defRPr sz="900" kern="1200"/>
+  </cs:valueAxis>
+  <cs:wall>
+    <cs:lnRef idx="0"/>
+    <cs:fillRef idx="0"/>
+    <cs:effectRef idx="0"/>
+    <cs:fontRef idx="minor">
+      <a:schemeClr val="tx1"/>
+    </cs:fontRef>
+    <cs:spPr>
+      <a:noFill/>
+      <a:ln>
+        <a:noFill/>
+      </a:ln>
+    </cs:spPr>
+  </cs:wall>
+</cs:chartStyle>
 </file>
 
 <file path=ppt/diagrams/colors1.xml><?xml version="1.0" encoding="utf-8"?>
@@ -5789,7 +6690,7 @@
             <a:fld id="{1449AA12-8195-4182-A7AC-2E7E59DFBDAF}" type="datetimeFigureOut">
               <a:rPr lang="en-US" smtClean="0"/>
               <a:pPr algn="r"/>
-              <a:t>11/30/2021</a:t>
+              <a:t>12/1/2021</a:t>
             </a:fld>
             <a:endParaRPr lang="en-US"/>
           </a:p>
@@ -6005,7 +6906,7 @@
           <a:p>
             <a:fld id="{1449AA12-8195-4182-A7AC-2E7E59DFBDAF}" type="datetimeFigureOut">
               <a:rPr lang="en-US" smtClean="0"/>
-              <a:t>11/30/2021</a:t>
+              <a:t>12/1/2021</a:t>
             </a:fld>
             <a:endParaRPr lang="en-US"/>
           </a:p>
@@ -6377,7 +7278,7 @@
           <a:p>
             <a:fld id="{1449AA12-8195-4182-A7AC-2E7E59DFBDAF}" type="datetimeFigureOut">
               <a:rPr lang="en-US" smtClean="0"/>
-              <a:t>11/30/2021</a:t>
+              <a:t>12/1/2021</a:t>
             </a:fld>
             <a:endParaRPr lang="en-US"/>
           </a:p>
@@ -6739,7 +7640,7 @@
           <a:p>
             <a:fld id="{1449AA12-8195-4182-A7AC-2E7E59DFBDAF}" type="datetimeFigureOut">
               <a:rPr lang="en-US" smtClean="0"/>
-              <a:t>11/30/2021</a:t>
+              <a:t>12/1/2021</a:t>
             </a:fld>
             <a:endParaRPr lang="en-US"/>
           </a:p>
@@ -7179,7 +8080,7 @@
           <a:p>
             <a:fld id="{1449AA12-8195-4182-A7AC-2E7E59DFBDAF}" type="datetimeFigureOut">
               <a:rPr lang="en-US" smtClean="0"/>
-              <a:t>11/30/2021</a:t>
+              <a:t>12/1/2021</a:t>
             </a:fld>
             <a:endParaRPr lang="en-US"/>
           </a:p>
@@ -7619,7 +8520,7 @@
           <a:p>
             <a:fld id="{1449AA12-8195-4182-A7AC-2E7E59DFBDAF}" type="datetimeFigureOut">
               <a:rPr lang="en-US" smtClean="0"/>
-              <a:t>11/30/2021</a:t>
+              <a:t>12/1/2021</a:t>
             </a:fld>
             <a:endParaRPr lang="en-US"/>
           </a:p>
@@ -8227,7 +9128,7 @@
           <a:p>
             <a:fld id="{1449AA12-8195-4182-A7AC-2E7E59DFBDAF}" type="datetimeFigureOut">
               <a:rPr lang="en-US" smtClean="0"/>
-              <a:t>11/30/2021</a:t>
+              <a:t>12/1/2021</a:t>
             </a:fld>
             <a:endParaRPr lang="en-US"/>
           </a:p>
@@ -8532,7 +9433,7 @@
           <a:p>
             <a:fld id="{1449AA12-8195-4182-A7AC-2E7E59DFBDAF}" type="datetimeFigureOut">
               <a:rPr lang="en-US" smtClean="0"/>
-              <a:t>11/30/2021</a:t>
+              <a:t>12/1/2021</a:t>
             </a:fld>
             <a:endParaRPr lang="en-US"/>
           </a:p>
@@ -8809,7 +9710,7 @@
           <a:p>
             <a:fld id="{1449AA12-8195-4182-A7AC-2E7E59DFBDAF}" type="datetimeFigureOut">
               <a:rPr lang="en-US" smtClean="0"/>
-              <a:t>11/30/2021</a:t>
+              <a:t>12/1/2021</a:t>
             </a:fld>
             <a:endParaRPr lang="en-US"/>
           </a:p>
@@ -9286,7 +10187,7 @@
           <a:p>
             <a:fld id="{1449AA12-8195-4182-A7AC-2E7E59DFBDAF}" type="datetimeFigureOut">
               <a:rPr lang="en-US" smtClean="0"/>
-              <a:t>11/30/2021</a:t>
+              <a:t>12/1/2021</a:t>
             </a:fld>
             <a:endParaRPr lang="en-US"/>
           </a:p>
@@ -9741,7 +10642,7 @@
           <a:p>
             <a:fld id="{1449AA12-8195-4182-A7AC-2E7E59DFBDAF}" type="datetimeFigureOut">
               <a:rPr lang="en-US" smtClean="0"/>
-              <a:t>11/30/2021</a:t>
+              <a:t>12/1/2021</a:t>
             </a:fld>
             <a:endParaRPr lang="en-US"/>
           </a:p>
@@ -10147,7 +11048,7 @@
             <a:fld id="{1449AA12-8195-4182-A7AC-2E7E59DFBDAF}" type="datetimeFigureOut">
               <a:rPr lang="en-US" smtClean="0"/>
               <a:pPr/>
-              <a:t>11/30/2021</a:t>
+              <a:t>12/1/2021</a:t>
             </a:fld>
             <a:endParaRPr lang="en-US"/>
           </a:p>
@@ -11619,42 +12520,6 @@
           </a:p>
         </p:txBody>
       </p:sp>
-      <p:pic>
-        <p:nvPicPr>
-          <p:cNvPr id="5" name="Picture 4" descr="Chart, bar chart&#10;&#10;Description automatically generated">
-            <a:extLst>
-              <a:ext uri="{FF2B5EF4-FFF2-40B4-BE49-F238E27FC236}">
-                <a16:creationId xmlns:a16="http://schemas.microsoft.com/office/drawing/2014/main" id="{A0374905-17F0-4526-9F12-8CD282813DF5}"/>
-              </a:ext>
-            </a:extLst>
-          </p:cNvPr>
-          <p:cNvPicPr>
-            <a:picLocks noChangeAspect="1"/>
-          </p:cNvPicPr>
-          <p:nvPr/>
-        </p:nvPicPr>
-        <p:blipFill>
-          <a:blip r:embed="rId2">
-            <a:extLst>
-              <a:ext uri="{28A0092B-C50C-407E-A947-70E740481C1C}">
-                <a14:useLocalDpi xmlns:a14="http://schemas.microsoft.com/office/drawing/2010/main" val="0"/>
-              </a:ext>
-            </a:extLst>
-          </a:blip>
-          <a:stretch>
-            <a:fillRect/>
-          </a:stretch>
-        </p:blipFill>
-        <p:spPr>
-          <a:xfrm>
-            <a:off x="54240" y="1633357"/>
-            <a:ext cx="5441599" cy="2887064"/>
-          </a:xfrm>
-          <a:prstGeom prst="rect">
-            <a:avLst/>
-          </a:prstGeom>
-        </p:spPr>
-      </p:pic>
       <p:sp>
         <p:nvSpPr>
           <p:cNvPr id="6" name="TextBox 5">
@@ -11694,6 +12559,36 @@
           </a:p>
         </p:txBody>
       </p:sp>
+      <p:graphicFrame>
+        <p:nvGraphicFramePr>
+          <p:cNvPr id="9" name="Chart 8">
+            <a:extLst>
+              <a:ext uri="{FF2B5EF4-FFF2-40B4-BE49-F238E27FC236}">
+                <a16:creationId xmlns:a16="http://schemas.microsoft.com/office/drawing/2014/main" id="{1BFBDE39-C99D-4854-A61D-F1FB4E862BB0}"/>
+              </a:ext>
+            </a:extLst>
+          </p:cNvPr>
+          <p:cNvGraphicFramePr>
+            <a:graphicFrameLocks/>
+          </p:cNvGraphicFramePr>
+          <p:nvPr>
+            <p:extLst>
+              <p:ext uri="{D42A27DB-BD31-4B8C-83A1-F6EECF244321}">
+                <p14:modId xmlns:p14="http://schemas.microsoft.com/office/powerpoint/2010/main" val="3152440194"/>
+              </p:ext>
+            </p:extLst>
+          </p:nvPr>
+        </p:nvGraphicFramePr>
+        <p:xfrm>
+          <a:off x="-2" y="1230571"/>
+          <a:ext cx="5106594" cy="3154709"/>
+        </p:xfrm>
+        <a:graphic>
+          <a:graphicData uri="http://schemas.openxmlformats.org/drawingml/2006/chart">
+            <c:chart xmlns:c="http://schemas.openxmlformats.org/drawingml/2006/chart" xmlns:r="http://schemas.openxmlformats.org/officeDocument/2006/relationships" r:id="rId2"/>
+          </a:graphicData>
+        </a:graphic>
+      </p:graphicFrame>
     </p:spTree>
     <p:extLst>
       <p:ext uri="{BB962C8B-B14F-4D97-AF65-F5344CB8AC3E}">
@@ -13076,7 +13971,7 @@
           <a:p>
             <a:r>
               <a:rPr lang="en-US" sz="1000" dirty="0"/>
-              <a:t>https://touchit.sk/ako-mozu-pomoct-pri-lieceni-cukrovky-informacne-technologie/352519d</a:t>
+              <a:t>https://touchit.sk/ako-mozu-pomoct-pri-lieceni-cukrovky-informacne-technologie/352519</a:t>
             </a:r>
           </a:p>
         </p:txBody>
@@ -13583,15 +14478,7 @@
             </a:r>
             <a:r>
               <a:rPr lang="sk-SK" sz="1400" dirty="0"/>
-              <a:t> ukazujú rozhranie </a:t>
-            </a:r>
-            <a:r>
-              <a:rPr lang="sk-SK" sz="1400" dirty="0" err="1"/>
-              <a:t>systemu</a:t>
-            </a:r>
-            <a:r>
-              <a:rPr lang="sk-SK" sz="1400" dirty="0"/>
-              <a:t> GIM </a:t>
+              <a:t> ukazujú rozhranie systému GIM </a:t>
             </a:r>
             <a:r>
               <a:rPr lang="en-US" sz="1400" dirty="0"/>

</xml_diff>